<commit_message>
use centralized css utils now
</commit_message>
<xml_diff>
--- a/output/notebook_example_dark.pptx
+++ b/output/notebook_example_dark.pptx
@@ -3405,7 +3405,7 @@
       </p:sp>
       <p:pic>
         <p:nvPicPr>
-          <p:cNvPr id="4" name="Picture 3" descr="slide_bc8113d8_create_sales_chart.png"/>
+          <p:cNvPr id="4" name="Picture 3" descr="slide_b2380a51_create_sales_chart.png"/>
           <p:cNvPicPr>
             <a:picLocks noChangeAspect="1"/>
           </p:cNvPicPr>
@@ -6123,7 +6123,7 @@
       </p:sp>
       <p:pic>
         <p:nvPicPr>
-          <p:cNvPr id="4" name="Picture 3" descr="slide_bc8113d8_create_sales_chart.png"/>
+          <p:cNvPr id="4" name="Picture 3" descr="slide_b2380a51_create_sales_chart.png"/>
           <p:cNvPicPr>
             <a:picLocks noChangeAspect="1"/>
           </p:cNvPicPr>
@@ -6445,7 +6445,7 @@
       </p:sp>
       <p:pic>
         <p:nvPicPr>
-          <p:cNvPr id="4" name="Picture 3" descr="slide_af09c7df_create_market_share.png"/>
+          <p:cNvPr id="4" name="Picture 3" descr="slide_232aaf6b_create_market_share.png"/>
           <p:cNvPicPr>
             <a:picLocks noChangeAspect="1"/>
           </p:cNvPicPr>
@@ -8321,7 +8321,7 @@
       </p:sp>
       <p:pic>
         <p:nvPicPr>
-          <p:cNvPr id="4" name="Picture 3" descr="slide_2781d4f0_create_growth_trend.png"/>
+          <p:cNvPr id="4" name="Picture 3" descr="slide_00cb9dae_create_growth_trend.png"/>
           <p:cNvPicPr>
             <a:picLocks noChangeAspect="1"/>
           </p:cNvPicPr>

</xml_diff>